<commit_message>
Update Spanish specs for easier chip naming
</commit_message>
<xml_diff>
--- a/Specification/Spanish/Editable source images/Imágenes Spec Parte 6 - Chips controladores.pptx
+++ b/Specification/Spanish/Editable source images/Imágenes Spec Parte 6 - Chips controladores.pptx
@@ -295,7 +295,7 @@
             <a:fld id="{1762487E-E677-4519-9D9B-00832401FE8D}" type="datetimeFigureOut">
               <a:rPr lang="es-ES" smtClean="0"/>
               <a:pPr/>
-              <a:t>06/01/2024</a:t>
+              <a:t>07/01/2024</a:t>
             </a:fld>
             <a:endParaRPr lang="es-ES"/>
           </a:p>
@@ -462,7 +462,7 @@
             <a:fld id="{1762487E-E677-4519-9D9B-00832401FE8D}" type="datetimeFigureOut">
               <a:rPr lang="es-ES" smtClean="0"/>
               <a:pPr/>
-              <a:t>06/01/2024</a:t>
+              <a:t>07/01/2024</a:t>
             </a:fld>
             <a:endParaRPr lang="es-ES"/>
           </a:p>
@@ -639,7 +639,7 @@
             <a:fld id="{1762487E-E677-4519-9D9B-00832401FE8D}" type="datetimeFigureOut">
               <a:rPr lang="es-ES" smtClean="0"/>
               <a:pPr/>
-              <a:t>06/01/2024</a:t>
+              <a:t>07/01/2024</a:t>
             </a:fld>
             <a:endParaRPr lang="es-ES"/>
           </a:p>
@@ -806,7 +806,7 @@
             <a:fld id="{1762487E-E677-4519-9D9B-00832401FE8D}" type="datetimeFigureOut">
               <a:rPr lang="es-ES" smtClean="0"/>
               <a:pPr/>
-              <a:t>06/01/2024</a:t>
+              <a:t>07/01/2024</a:t>
             </a:fld>
             <a:endParaRPr lang="es-ES"/>
           </a:p>
@@ -1049,7 +1049,7 @@
             <a:fld id="{1762487E-E677-4519-9D9B-00832401FE8D}" type="datetimeFigureOut">
               <a:rPr lang="es-ES" smtClean="0"/>
               <a:pPr/>
-              <a:t>06/01/2024</a:t>
+              <a:t>07/01/2024</a:t>
             </a:fld>
             <a:endParaRPr lang="es-ES"/>
           </a:p>
@@ -1334,7 +1334,7 @@
             <a:fld id="{1762487E-E677-4519-9D9B-00832401FE8D}" type="datetimeFigureOut">
               <a:rPr lang="es-ES" smtClean="0"/>
               <a:pPr/>
-              <a:t>06/01/2024</a:t>
+              <a:t>07/01/2024</a:t>
             </a:fld>
             <a:endParaRPr lang="es-ES"/>
           </a:p>
@@ -1758,7 +1758,7 @@
             <a:fld id="{1762487E-E677-4519-9D9B-00832401FE8D}" type="datetimeFigureOut">
               <a:rPr lang="es-ES" smtClean="0"/>
               <a:pPr/>
-              <a:t>06/01/2024</a:t>
+              <a:t>07/01/2024</a:t>
             </a:fld>
             <a:endParaRPr lang="es-ES"/>
           </a:p>
@@ -1873,7 +1873,7 @@
             <a:fld id="{1762487E-E677-4519-9D9B-00832401FE8D}" type="datetimeFigureOut">
               <a:rPr lang="es-ES" smtClean="0"/>
               <a:pPr/>
-              <a:t>06/01/2024</a:t>
+              <a:t>07/01/2024</a:t>
             </a:fld>
             <a:endParaRPr lang="es-ES"/>
           </a:p>
@@ -1965,7 +1965,7 @@
             <a:fld id="{1762487E-E677-4519-9D9B-00832401FE8D}" type="datetimeFigureOut">
               <a:rPr lang="es-ES" smtClean="0"/>
               <a:pPr/>
-              <a:t>06/01/2024</a:t>
+              <a:t>07/01/2024</a:t>
             </a:fld>
             <a:endParaRPr lang="es-ES"/>
           </a:p>
@@ -2239,7 +2239,7 @@
             <a:fld id="{1762487E-E677-4519-9D9B-00832401FE8D}" type="datetimeFigureOut">
               <a:rPr lang="es-ES" smtClean="0"/>
               <a:pPr/>
-              <a:t>06/01/2024</a:t>
+              <a:t>07/01/2024</a:t>
             </a:fld>
             <a:endParaRPr lang="es-ES"/>
           </a:p>
@@ -2489,7 +2489,7 @@
             <a:fld id="{1762487E-E677-4519-9D9B-00832401FE8D}" type="datetimeFigureOut">
               <a:rPr lang="es-ES" smtClean="0"/>
               <a:pPr/>
-              <a:t>06/01/2024</a:t>
+              <a:t>07/01/2024</a:t>
             </a:fld>
             <a:endParaRPr lang="es-ES"/>
           </a:p>
@@ -2702,7 +2702,7 @@
             <a:fld id="{1762487E-E677-4519-9D9B-00832401FE8D}" type="datetimeFigureOut">
               <a:rPr lang="es-ES" smtClean="0"/>
               <a:pPr/>
-              <a:t>06/01/2024</a:t>
+              <a:t>07/01/2024</a:t>
             </a:fld>
             <a:endParaRPr lang="es-ES"/>
           </a:p>
@@ -3480,23 +3480,7 @@
                   <a:srgbClr val="006600"/>
                 </a:solidFill>
               </a:rPr>
-              <a:t>Memoria </a:t>
-            </a:r>
-            <a:r>
-              <a:rPr lang="es-ES" sz="1400" smtClean="0">
-                <a:solidFill>
-                  <a:srgbClr val="006600"/>
-                </a:solidFill>
-              </a:rPr>
-              <a:t>o </a:t>
-            </a:r>
-            <a:r>
-              <a:rPr lang="es-ES" sz="1400" smtClean="0">
-                <a:solidFill>
-                  <a:srgbClr val="006600"/>
-                </a:solidFill>
-              </a:rPr>
-              <a:t>estado interno</a:t>
+              <a:t>Memoria o estado interno</a:t>
             </a:r>
             <a:endParaRPr lang="es-ES" sz="1400">
               <a:solidFill>
@@ -3824,15 +3808,7 @@
                   <a:srgbClr val="C00000"/>
                 </a:solidFill>
               </a:rPr>
-              <a:t>de </a:t>
-            </a:r>
-            <a:r>
-              <a:rPr lang="es-ES" sz="1600" b="1" smtClean="0">
-                <a:solidFill>
-                  <a:srgbClr val="C00000"/>
-                </a:solidFill>
-              </a:rPr>
-              <a:t>mandos</a:t>
+              <a:t>de mandos</a:t>
             </a:r>
             <a:endParaRPr lang="es-ES" sz="1600" b="1">
               <a:solidFill>
@@ -4707,7 +4683,7 @@
           <p:cNvPr id="9" name="CuadroTexto 19">
             <a:extLst>
               <a:ext uri="{FF2B5EF4-FFF2-40B4-BE49-F238E27FC236}">
-                <a16:creationId xmlns:a16="http://schemas.microsoft.com/office/drawing/2014/main" xmlns="" id="{B81A97C9-B44A-4DCA-962F-3BB6FD3A6362}"/>
+                <a16:creationId xmlns="" xmlns:a16="http://schemas.microsoft.com/office/drawing/2014/main" id="{B81A97C9-B44A-4DCA-962F-3BB6FD3A6362}"/>
               </a:ext>
             </a:extLst>
           </p:cNvPr>
@@ -5376,7 +5352,7 @@
           <p:cNvPr id="27" name="36 Conector">
             <a:extLst>
               <a:ext uri="{FF2B5EF4-FFF2-40B4-BE49-F238E27FC236}">
-                <a16:creationId xmlns:a16="http://schemas.microsoft.com/office/drawing/2014/main" xmlns="" id="{11CC1446-9291-450E-9B53-2A15F8DBEF08}"/>
+                <a16:creationId xmlns="" xmlns:a16="http://schemas.microsoft.com/office/drawing/2014/main" id="{11CC1446-9291-450E-9B53-2A15F8DBEF08}"/>
               </a:ext>
             </a:extLst>
           </p:cNvPr>
@@ -5428,7 +5404,7 @@
           <p:cNvPr id="28" name="29 Conector recto de flecha">
             <a:extLst>
               <a:ext uri="{FF2B5EF4-FFF2-40B4-BE49-F238E27FC236}">
-                <a16:creationId xmlns:a16="http://schemas.microsoft.com/office/drawing/2014/main" xmlns="" id="{E051F635-5666-428C-91BF-EB77E088BD3E}"/>
+                <a16:creationId xmlns="" xmlns:a16="http://schemas.microsoft.com/office/drawing/2014/main" id="{E051F635-5666-428C-91BF-EB77E088BD3E}"/>
               </a:ext>
             </a:extLst>
           </p:cNvPr>
@@ -5471,7 +5447,7 @@
           <p:cNvPr id="30" name="16 Decisión">
             <a:extLst>
               <a:ext uri="{FF2B5EF4-FFF2-40B4-BE49-F238E27FC236}">
-                <a16:creationId xmlns:a16="http://schemas.microsoft.com/office/drawing/2014/main" xmlns="" id="{FD2C65EB-311B-4CBC-A411-E81D45AF1666}"/>
+                <a16:creationId xmlns="" xmlns:a16="http://schemas.microsoft.com/office/drawing/2014/main" id="{FD2C65EB-311B-4CBC-A411-E81D45AF1666}"/>
               </a:ext>
             </a:extLst>
           </p:cNvPr>
@@ -5529,7 +5505,7 @@
           <p:cNvPr id="46" name="30 CuadroTexto">
             <a:extLst>
               <a:ext uri="{FF2B5EF4-FFF2-40B4-BE49-F238E27FC236}">
-                <a16:creationId xmlns:a16="http://schemas.microsoft.com/office/drawing/2014/main" xmlns="" id="{4C0646B8-2B7E-4579-AEF8-C28BED180070}"/>
+                <a16:creationId xmlns="" xmlns:a16="http://schemas.microsoft.com/office/drawing/2014/main" id="{4C0646B8-2B7E-4579-AEF8-C28BED180070}"/>
               </a:ext>
             </a:extLst>
           </p:cNvPr>
@@ -5566,7 +5542,7 @@
           <p:cNvPr id="48" name="29 Conector recto de flecha">
             <a:extLst>
               <a:ext uri="{FF2B5EF4-FFF2-40B4-BE49-F238E27FC236}">
-                <a16:creationId xmlns:a16="http://schemas.microsoft.com/office/drawing/2014/main" xmlns="" id="{E051F635-5666-428C-91BF-EB77E088BD3E}"/>
+                <a16:creationId xmlns="" xmlns:a16="http://schemas.microsoft.com/office/drawing/2014/main" id="{E051F635-5666-428C-91BF-EB77E088BD3E}"/>
               </a:ext>
             </a:extLst>
           </p:cNvPr>
@@ -5609,7 +5585,7 @@
           <p:cNvPr id="49" name="29 Conector recto de flecha">
             <a:extLst>
               <a:ext uri="{FF2B5EF4-FFF2-40B4-BE49-F238E27FC236}">
-                <a16:creationId xmlns:a16="http://schemas.microsoft.com/office/drawing/2014/main" xmlns="" id="{E051F635-5666-428C-91BF-EB77E088BD3E}"/>
+                <a16:creationId xmlns="" xmlns:a16="http://schemas.microsoft.com/office/drawing/2014/main" id="{E051F635-5666-428C-91BF-EB77E088BD3E}"/>
               </a:ext>
             </a:extLst>
           </p:cNvPr>
@@ -5651,7 +5627,7 @@
           <p:cNvPr id="51" name="20 Rectángulo redondeado">
             <a:extLst>
               <a:ext uri="{FF2B5EF4-FFF2-40B4-BE49-F238E27FC236}">
-                <a16:creationId xmlns:a16="http://schemas.microsoft.com/office/drawing/2014/main" xmlns="" id="{7938FCD4-2AEB-4A9C-BFA6-FF58F425573D}"/>
+                <a16:creationId xmlns="" xmlns:a16="http://schemas.microsoft.com/office/drawing/2014/main" id="{7938FCD4-2AEB-4A9C-BFA6-FF58F425573D}"/>
               </a:ext>
             </a:extLst>
           </p:cNvPr>
@@ -5712,7 +5688,7 @@
           <p:cNvPr id="52" name="19 Grupo">
             <a:extLst>
               <a:ext uri="{FF2B5EF4-FFF2-40B4-BE49-F238E27FC236}">
-                <a16:creationId xmlns:a16="http://schemas.microsoft.com/office/drawing/2014/main" xmlns="" id="{72728B6F-9E0E-4855-9B6A-D98006B948B6}"/>
+                <a16:creationId xmlns="" xmlns:a16="http://schemas.microsoft.com/office/drawing/2014/main" id="{72728B6F-9E0E-4855-9B6A-D98006B948B6}"/>
               </a:ext>
             </a:extLst>
           </p:cNvPr>
@@ -5732,7 +5708,7 @@
             <p:cNvPr id="53" name="42 Conector">
               <a:extLst>
                 <a:ext uri="{FF2B5EF4-FFF2-40B4-BE49-F238E27FC236}">
-                  <a16:creationId xmlns:a16="http://schemas.microsoft.com/office/drawing/2014/main" xmlns="" id="{373A1267-C09A-4344-AB04-4D134201A6BE}"/>
+                  <a16:creationId xmlns="" xmlns:a16="http://schemas.microsoft.com/office/drawing/2014/main" id="{373A1267-C09A-4344-AB04-4D134201A6BE}"/>
                 </a:ext>
               </a:extLst>
             </p:cNvPr>
@@ -5789,7 +5765,7 @@
             <p:cNvPr id="54" name="43 Conector">
               <a:extLst>
                 <a:ext uri="{FF2B5EF4-FFF2-40B4-BE49-F238E27FC236}">
-                  <a16:creationId xmlns:a16="http://schemas.microsoft.com/office/drawing/2014/main" xmlns="" id="{63920072-F0D4-437F-AAD7-67A75B8A9057}"/>
+                  <a16:creationId xmlns="" xmlns:a16="http://schemas.microsoft.com/office/drawing/2014/main" id="{63920072-F0D4-437F-AAD7-67A75B8A9057}"/>
                 </a:ext>
               </a:extLst>
             </p:cNvPr>
@@ -5844,7 +5820,7 @@
           <p:cNvPr id="55" name="29 Conector recto de flecha">
             <a:extLst>
               <a:ext uri="{FF2B5EF4-FFF2-40B4-BE49-F238E27FC236}">
-                <a16:creationId xmlns:a16="http://schemas.microsoft.com/office/drawing/2014/main" xmlns="" id="{D6C31BC0-E444-49C8-BD7A-147BEB33D395}"/>
+                <a16:creationId xmlns="" xmlns:a16="http://schemas.microsoft.com/office/drawing/2014/main" id="{D6C31BC0-E444-49C8-BD7A-147BEB33D395}"/>
               </a:ext>
             </a:extLst>
           </p:cNvPr>
@@ -5887,7 +5863,7 @@
           <p:cNvPr id="59" name="16 Decisión">
             <a:extLst>
               <a:ext uri="{FF2B5EF4-FFF2-40B4-BE49-F238E27FC236}">
-                <a16:creationId xmlns:a16="http://schemas.microsoft.com/office/drawing/2014/main" xmlns="" id="{FD2C65EB-311B-4CBC-A411-E81D45AF1666}"/>
+                <a16:creationId xmlns="" xmlns:a16="http://schemas.microsoft.com/office/drawing/2014/main" id="{FD2C65EB-311B-4CBC-A411-E81D45AF1666}"/>
               </a:ext>
             </a:extLst>
           </p:cNvPr>
@@ -5945,7 +5921,7 @@
           <p:cNvPr id="60" name="30 CuadroTexto">
             <a:extLst>
               <a:ext uri="{FF2B5EF4-FFF2-40B4-BE49-F238E27FC236}">
-                <a16:creationId xmlns:a16="http://schemas.microsoft.com/office/drawing/2014/main" xmlns="" id="{6FAC7A1A-4EE0-4C6E-8C57-737F69FEEA58}"/>
+                <a16:creationId xmlns="" xmlns:a16="http://schemas.microsoft.com/office/drawing/2014/main" id="{6FAC7A1A-4EE0-4C6E-8C57-737F69FEEA58}"/>
               </a:ext>
             </a:extLst>
           </p:cNvPr>
@@ -5981,7 +5957,7 @@
           <p:cNvPr id="61" name="30 CuadroTexto">
             <a:extLst>
               <a:ext uri="{FF2B5EF4-FFF2-40B4-BE49-F238E27FC236}">
-                <a16:creationId xmlns:a16="http://schemas.microsoft.com/office/drawing/2014/main" xmlns="" id="{5B67840B-D3E7-4642-A33C-52505043E768}"/>
+                <a16:creationId xmlns="" xmlns:a16="http://schemas.microsoft.com/office/drawing/2014/main" id="{5B67840B-D3E7-4642-A33C-52505043E768}"/>
               </a:ext>
             </a:extLst>
           </p:cNvPr>
@@ -6016,7 +5992,7 @@
           <p:cNvPr id="64" name="30 CuadroTexto">
             <a:extLst>
               <a:ext uri="{FF2B5EF4-FFF2-40B4-BE49-F238E27FC236}">
-                <a16:creationId xmlns:a16="http://schemas.microsoft.com/office/drawing/2014/main" xmlns="" id="{4C0646B8-2B7E-4579-AEF8-C28BED180070}"/>
+                <a16:creationId xmlns="" xmlns:a16="http://schemas.microsoft.com/office/drawing/2014/main" id="{4C0646B8-2B7E-4579-AEF8-C28BED180070}"/>
               </a:ext>
             </a:extLst>
           </p:cNvPr>
@@ -6053,7 +6029,7 @@
           <p:cNvPr id="68" name="29 Conector recto de flecha">
             <a:extLst>
               <a:ext uri="{FF2B5EF4-FFF2-40B4-BE49-F238E27FC236}">
-                <a16:creationId xmlns:a16="http://schemas.microsoft.com/office/drawing/2014/main" xmlns="" id="{E051F635-5666-428C-91BF-EB77E088BD3E}"/>
+                <a16:creationId xmlns="" xmlns:a16="http://schemas.microsoft.com/office/drawing/2014/main" id="{E051F635-5666-428C-91BF-EB77E088BD3E}"/>
               </a:ext>
             </a:extLst>
           </p:cNvPr>
@@ -6095,7 +6071,7 @@
           <p:cNvPr id="70" name="30 CuadroTexto">
             <a:extLst>
               <a:ext uri="{FF2B5EF4-FFF2-40B4-BE49-F238E27FC236}">
-                <a16:creationId xmlns:a16="http://schemas.microsoft.com/office/drawing/2014/main" xmlns="" id="{6FAC7A1A-4EE0-4C6E-8C57-737F69FEEA58}"/>
+                <a16:creationId xmlns="" xmlns:a16="http://schemas.microsoft.com/office/drawing/2014/main" id="{6FAC7A1A-4EE0-4C6E-8C57-737F69FEEA58}"/>
               </a:ext>
             </a:extLst>
           </p:cNvPr>
@@ -6130,7 +6106,7 @@
           <p:cNvPr id="71" name="30 CuadroTexto">
             <a:extLst>
               <a:ext uri="{FF2B5EF4-FFF2-40B4-BE49-F238E27FC236}">
-                <a16:creationId xmlns:a16="http://schemas.microsoft.com/office/drawing/2014/main" xmlns="" id="{5B67840B-D3E7-4642-A33C-52505043E768}"/>
+                <a16:creationId xmlns="" xmlns:a16="http://schemas.microsoft.com/office/drawing/2014/main" id="{5B67840B-D3E7-4642-A33C-52505043E768}"/>
               </a:ext>
             </a:extLst>
           </p:cNvPr>
@@ -6165,7 +6141,7 @@
           <p:cNvPr id="76" name="16 Decisión">
             <a:extLst>
               <a:ext uri="{FF2B5EF4-FFF2-40B4-BE49-F238E27FC236}">
-                <a16:creationId xmlns:a16="http://schemas.microsoft.com/office/drawing/2014/main" xmlns="" id="{FD2C65EB-311B-4CBC-A411-E81D45AF1666}"/>
+                <a16:creationId xmlns="" xmlns:a16="http://schemas.microsoft.com/office/drawing/2014/main" id="{FD2C65EB-311B-4CBC-A411-E81D45AF1666}"/>
               </a:ext>
             </a:extLst>
           </p:cNvPr>
@@ -6223,7 +6199,7 @@
           <p:cNvPr id="77" name="30 CuadroTexto">
             <a:extLst>
               <a:ext uri="{FF2B5EF4-FFF2-40B4-BE49-F238E27FC236}">
-                <a16:creationId xmlns:a16="http://schemas.microsoft.com/office/drawing/2014/main" xmlns="" id="{4C0646B8-2B7E-4579-AEF8-C28BED180070}"/>
+                <a16:creationId xmlns="" xmlns:a16="http://schemas.microsoft.com/office/drawing/2014/main" id="{4C0646B8-2B7E-4579-AEF8-C28BED180070}"/>
               </a:ext>
             </a:extLst>
           </p:cNvPr>
@@ -6296,7 +6272,7 @@
           <p:cNvPr id="80" name="16 Decisión">
             <a:extLst>
               <a:ext uri="{FF2B5EF4-FFF2-40B4-BE49-F238E27FC236}">
-                <a16:creationId xmlns:a16="http://schemas.microsoft.com/office/drawing/2014/main" xmlns="" id="{FD2C65EB-311B-4CBC-A411-E81D45AF1666}"/>
+                <a16:creationId xmlns="" xmlns:a16="http://schemas.microsoft.com/office/drawing/2014/main" id="{FD2C65EB-311B-4CBC-A411-E81D45AF1666}"/>
               </a:ext>
             </a:extLst>
           </p:cNvPr>
@@ -6354,7 +6330,7 @@
           <p:cNvPr id="84" name="29 Conector recto de flecha">
             <a:extLst>
               <a:ext uri="{FF2B5EF4-FFF2-40B4-BE49-F238E27FC236}">
-                <a16:creationId xmlns:a16="http://schemas.microsoft.com/office/drawing/2014/main" xmlns="" id="{E051F635-5666-428C-91BF-EB77E088BD3E}"/>
+                <a16:creationId xmlns="" xmlns:a16="http://schemas.microsoft.com/office/drawing/2014/main" id="{E051F635-5666-428C-91BF-EB77E088BD3E}"/>
               </a:ext>
             </a:extLst>
           </p:cNvPr>
@@ -6397,7 +6373,7 @@
           <p:cNvPr id="85" name="29 Conector recto de flecha">
             <a:extLst>
               <a:ext uri="{FF2B5EF4-FFF2-40B4-BE49-F238E27FC236}">
-                <a16:creationId xmlns:a16="http://schemas.microsoft.com/office/drawing/2014/main" xmlns="" id="{E051F635-5666-428C-91BF-EB77E088BD3E}"/>
+                <a16:creationId xmlns="" xmlns:a16="http://schemas.microsoft.com/office/drawing/2014/main" id="{E051F635-5666-428C-91BF-EB77E088BD3E}"/>
               </a:ext>
             </a:extLst>
           </p:cNvPr>
@@ -6440,7 +6416,7 @@
           <p:cNvPr id="87" name="20 Rectángulo redondeado">
             <a:extLst>
               <a:ext uri="{FF2B5EF4-FFF2-40B4-BE49-F238E27FC236}">
-                <a16:creationId xmlns:a16="http://schemas.microsoft.com/office/drawing/2014/main" xmlns="" id="{7938FCD4-2AEB-4A9C-BFA6-FF58F425573D}"/>
+                <a16:creationId xmlns="" xmlns:a16="http://schemas.microsoft.com/office/drawing/2014/main" id="{7938FCD4-2AEB-4A9C-BFA6-FF58F425573D}"/>
               </a:ext>
             </a:extLst>
           </p:cNvPr>
@@ -6508,7 +6484,7 @@
           <p:cNvPr id="88" name="20 Rectángulo redondeado">
             <a:extLst>
               <a:ext uri="{FF2B5EF4-FFF2-40B4-BE49-F238E27FC236}">
-                <a16:creationId xmlns:a16="http://schemas.microsoft.com/office/drawing/2014/main" xmlns="" id="{7938FCD4-2AEB-4A9C-BFA6-FF58F425573D}"/>
+                <a16:creationId xmlns="" xmlns:a16="http://schemas.microsoft.com/office/drawing/2014/main" id="{7938FCD4-2AEB-4A9C-BFA6-FF58F425573D}"/>
               </a:ext>
             </a:extLst>
           </p:cNvPr>
@@ -6569,7 +6545,7 @@
           <p:cNvPr id="89" name="20 Rectángulo redondeado">
             <a:extLst>
               <a:ext uri="{FF2B5EF4-FFF2-40B4-BE49-F238E27FC236}">
-                <a16:creationId xmlns:a16="http://schemas.microsoft.com/office/drawing/2014/main" xmlns="" id="{7938FCD4-2AEB-4A9C-BFA6-FF58F425573D}"/>
+                <a16:creationId xmlns="" xmlns:a16="http://schemas.microsoft.com/office/drawing/2014/main" id="{7938FCD4-2AEB-4A9C-BFA6-FF58F425573D}"/>
               </a:ext>
             </a:extLst>
           </p:cNvPr>
@@ -6630,7 +6606,7 @@
           <p:cNvPr id="90" name="20 Rectángulo redondeado">
             <a:extLst>
               <a:ext uri="{FF2B5EF4-FFF2-40B4-BE49-F238E27FC236}">
-                <a16:creationId xmlns:a16="http://schemas.microsoft.com/office/drawing/2014/main" xmlns="" id="{7938FCD4-2AEB-4A9C-BFA6-FF58F425573D}"/>
+                <a16:creationId xmlns="" xmlns:a16="http://schemas.microsoft.com/office/drawing/2014/main" id="{7938FCD4-2AEB-4A9C-BFA6-FF58F425573D}"/>
               </a:ext>
             </a:extLst>
           </p:cNvPr>
@@ -6770,7 +6746,7 @@
           <p:cNvPr id="42" name="19 Grupo">
             <a:extLst>
               <a:ext uri="{FF2B5EF4-FFF2-40B4-BE49-F238E27FC236}">
-                <a16:creationId xmlns:a16="http://schemas.microsoft.com/office/drawing/2014/main" xmlns="" id="{72728B6F-9E0E-4855-9B6A-D98006B948B6}"/>
+                <a16:creationId xmlns="" xmlns:a16="http://schemas.microsoft.com/office/drawing/2014/main" id="{72728B6F-9E0E-4855-9B6A-D98006B948B6}"/>
               </a:ext>
             </a:extLst>
           </p:cNvPr>
@@ -6790,7 +6766,7 @@
             <p:cNvPr id="43" name="42 Conector">
               <a:extLst>
                 <a:ext uri="{FF2B5EF4-FFF2-40B4-BE49-F238E27FC236}">
-                  <a16:creationId xmlns:a16="http://schemas.microsoft.com/office/drawing/2014/main" xmlns="" id="{373A1267-C09A-4344-AB04-4D134201A6BE}"/>
+                  <a16:creationId xmlns="" xmlns:a16="http://schemas.microsoft.com/office/drawing/2014/main" id="{373A1267-C09A-4344-AB04-4D134201A6BE}"/>
                 </a:ext>
               </a:extLst>
             </p:cNvPr>
@@ -6847,7 +6823,7 @@
             <p:cNvPr id="44" name="43 Conector">
               <a:extLst>
                 <a:ext uri="{FF2B5EF4-FFF2-40B4-BE49-F238E27FC236}">
-                  <a16:creationId xmlns:a16="http://schemas.microsoft.com/office/drawing/2014/main" xmlns="" id="{63920072-F0D4-437F-AAD7-67A75B8A9057}"/>
+                  <a16:creationId xmlns="" xmlns:a16="http://schemas.microsoft.com/office/drawing/2014/main" id="{63920072-F0D4-437F-AAD7-67A75B8A9057}"/>
                 </a:ext>
               </a:extLst>
             </p:cNvPr>
@@ -6974,7 +6950,7 @@
           <p:cNvPr id="74" name="29 Conector recto de flecha">
             <a:extLst>
               <a:ext uri="{FF2B5EF4-FFF2-40B4-BE49-F238E27FC236}">
-                <a16:creationId xmlns:a16="http://schemas.microsoft.com/office/drawing/2014/main" xmlns="" id="{E051F635-5666-428C-91BF-EB77E088BD3E}"/>
+                <a16:creationId xmlns="" xmlns:a16="http://schemas.microsoft.com/office/drawing/2014/main" id="{E051F635-5666-428C-91BF-EB77E088BD3E}"/>
               </a:ext>
             </a:extLst>
           </p:cNvPr>
@@ -7017,7 +6993,7 @@
           <p:cNvPr id="82" name="29 Conector recto de flecha">
             <a:extLst>
               <a:ext uri="{FF2B5EF4-FFF2-40B4-BE49-F238E27FC236}">
-                <a16:creationId xmlns:a16="http://schemas.microsoft.com/office/drawing/2014/main" xmlns="" id="{E051F635-5666-428C-91BF-EB77E088BD3E}"/>
+                <a16:creationId xmlns="" xmlns:a16="http://schemas.microsoft.com/office/drawing/2014/main" id="{E051F635-5666-428C-91BF-EB77E088BD3E}"/>
               </a:ext>
             </a:extLst>
           </p:cNvPr>
@@ -7060,7 +7036,7 @@
           <p:cNvPr id="94" name="30 CuadroTexto">
             <a:extLst>
               <a:ext uri="{FF2B5EF4-FFF2-40B4-BE49-F238E27FC236}">
-                <a16:creationId xmlns:a16="http://schemas.microsoft.com/office/drawing/2014/main" xmlns="" id="{6FAC7A1A-4EE0-4C6E-8C57-737F69FEEA58}"/>
+                <a16:creationId xmlns="" xmlns:a16="http://schemas.microsoft.com/office/drawing/2014/main" id="{6FAC7A1A-4EE0-4C6E-8C57-737F69FEEA58}"/>
               </a:ext>
             </a:extLst>
           </p:cNvPr>
@@ -7095,7 +7071,7 @@
           <p:cNvPr id="95" name="30 CuadroTexto">
             <a:extLst>
               <a:ext uri="{FF2B5EF4-FFF2-40B4-BE49-F238E27FC236}">
-                <a16:creationId xmlns:a16="http://schemas.microsoft.com/office/drawing/2014/main" xmlns="" id="{5B67840B-D3E7-4642-A33C-52505043E768}"/>
+                <a16:creationId xmlns="" xmlns:a16="http://schemas.microsoft.com/office/drawing/2014/main" id="{5B67840B-D3E7-4642-A33C-52505043E768}"/>
               </a:ext>
             </a:extLst>
           </p:cNvPr>
@@ -7130,7 +7106,7 @@
           <p:cNvPr id="99" name="30 CuadroTexto">
             <a:extLst>
               <a:ext uri="{FF2B5EF4-FFF2-40B4-BE49-F238E27FC236}">
-                <a16:creationId xmlns:a16="http://schemas.microsoft.com/office/drawing/2014/main" xmlns="" id="{6FAC7A1A-4EE0-4C6E-8C57-737F69FEEA58}"/>
+                <a16:creationId xmlns="" xmlns:a16="http://schemas.microsoft.com/office/drawing/2014/main" id="{6FAC7A1A-4EE0-4C6E-8C57-737F69FEEA58}"/>
               </a:ext>
             </a:extLst>
           </p:cNvPr>
@@ -7165,7 +7141,7 @@
           <p:cNvPr id="100" name="30 CuadroTexto">
             <a:extLst>
               <a:ext uri="{FF2B5EF4-FFF2-40B4-BE49-F238E27FC236}">
-                <a16:creationId xmlns:a16="http://schemas.microsoft.com/office/drawing/2014/main" xmlns="" id="{5B67840B-D3E7-4642-A33C-52505043E768}"/>
+                <a16:creationId xmlns="" xmlns:a16="http://schemas.microsoft.com/office/drawing/2014/main" id="{5B67840B-D3E7-4642-A33C-52505043E768}"/>
               </a:ext>
             </a:extLst>
           </p:cNvPr>
@@ -7273,7 +7249,7 @@
                   <a:srgbClr val="006600"/>
                 </a:solidFill>
               </a:rPr>
-              <a:t>Cartridge</a:t>
+              <a:t>Cartucho</a:t>
             </a:r>
             <a:endParaRPr lang="es-ES" sz="1600">
               <a:solidFill>
@@ -8644,15 +8620,7 @@
                   <a:srgbClr val="C00000"/>
                 </a:solidFill>
               </a:rPr>
-              <a:t>Controlador </a:t>
-            </a:r>
-            <a:r>
-              <a:rPr lang="es-ES" sz="1600" b="1" smtClean="0">
-                <a:solidFill>
-                  <a:srgbClr val="C00000"/>
-                </a:solidFill>
-              </a:rPr>
-              <a:t>de tarjeta</a:t>
+              <a:t>Controlador de tarjeta</a:t>
             </a:r>
             <a:endParaRPr lang="es-ES" sz="1600" b="1">
               <a:solidFill>

</xml_diff>